<commit_message>
edit ppt with my challeneges and other questions
</commit_message>
<xml_diff>
--- a/Project4 Presentation.pptx
+++ b/Project4 Presentation.pptx
@@ -109,6 +109,11 @@
       </a:defRPr>
     </a:lvl9pPr>
   </p:defaultTextStyle>
+  <p:extLst>
+    <p:ext uri="{EFAFB233-063F-42B5-8137-9DF3F51BA10A}">
+      <p15:sldGuideLst xmlns:p15="http://schemas.microsoft.com/office/powerpoint/2012/main"/>
+    </p:ext>
+  </p:extLst>
 </p:presentation>
 </file>
 
@@ -6208,8 +6213,9 @@
           <a:p>
             <a:r>
               <a:rPr lang="en-US" dirty="0" smtClean="0"/>
-              <a:t>Michael</a:t>
-            </a:r>
+              <a:t>Michael – Getting the extension to work in the proper manner. The skills based off of the weapons a leveling based on the usage of the weapon did not make this version. I would have started with the GUI first instead of the console based and start with slightly more modular classes.</a:t>
+            </a:r>
+            <a:endParaRPr lang="en-US" dirty="0" smtClean="0"/>
           </a:p>
           <a:p>
             <a:pPr marL="0" indent="0">

</xml_diff>